<commit_message>
version finale ma bite
</commit_message>
<xml_diff>
--- a/prez/ROGER.pptx
+++ b/prez/ROGER.pptx
@@ -7,6 +7,9 @@
   <p:sldIdLst>
     <p:sldId id="256" r:id="rId2"/>
     <p:sldId id="257" r:id="rId3"/>
+    <p:sldId id="258" r:id="rId4"/>
+    <p:sldId id="259" r:id="rId5"/>
+    <p:sldId id="260" r:id="rId6"/>
   </p:sldIdLst>
   <p:sldSz cx="12192000" cy="6858000"/>
   <p:notesSz cx="6858000" cy="9144000"/>
@@ -105,6 +108,11 @@
       </a:defRPr>
     </a:lvl9pPr>
   </p:defaultTextStyle>
+  <p:extLst>
+    <p:ext uri="{EFAFB233-063F-42B5-8137-9DF3F51BA10A}">
+      <p15:sldGuideLst xmlns:p15="http://schemas.microsoft.com/office/powerpoint/2012/main"/>
+    </p:ext>
+  </p:extLst>
 </p:presentation>
 </file>
 
@@ -5618,10 +5626,14 @@
           <a:lstStyle/>
           <a:p>
             <a:r>
-              <a:rPr lang="fr-FR" dirty="0" smtClean="0"/>
+              <a:rPr lang="fr-FR" dirty="0" smtClean="0">
+                <a:latin typeface="Calibri" panose="020F0502020204030204" pitchFamily="34" charset="0"/>
+              </a:rPr>
               <a:t>Disponible sur le marché</a:t>
             </a:r>
-            <a:endParaRPr lang="fr-FR" dirty="0"/>
+            <a:endParaRPr lang="fr-FR" dirty="0">
+              <a:latin typeface="Calibri" panose="020F0502020204030204" pitchFamily="34" charset="0"/>
+            </a:endParaRPr>
           </a:p>
         </p:txBody>
       </p:sp>
@@ -5637,7 +5649,7 @@
         </p:nvSpPr>
         <p:spPr>
           <a:xfrm>
-            <a:off x="615200" y="1931358"/>
+            <a:off x="615200" y="1810591"/>
             <a:ext cx="8534400" cy="3615267"/>
           </a:xfrm>
         </p:spPr>
@@ -5646,78 +5658,115 @@
           <a:lstStyle/>
           <a:p>
             <a:r>
-              <a:rPr lang="fr-FR" dirty="0" smtClean="0"/>
+              <a:rPr lang="fr-FR" dirty="0" smtClean="0">
+                <a:latin typeface="Calibri" panose="020F0502020204030204" pitchFamily="34" charset="0"/>
+              </a:rPr>
               <a:t>Jeux de gestion : </a:t>
             </a:r>
           </a:p>
           <a:p>
             <a:pPr lvl="1"/>
             <a:r>
-              <a:rPr lang="fr-FR" dirty="0" smtClean="0"/>
-              <a:t>Clash of clans</a:t>
-            </a:r>
+              <a:rPr lang="fr-FR" dirty="0" smtClean="0">
+                <a:latin typeface="Calibri" panose="020F0502020204030204" pitchFamily="34" charset="0"/>
+              </a:rPr>
+              <a:t>Clash of </a:t>
+            </a:r>
+            <a:r>
+              <a:rPr lang="fr-FR" dirty="0" smtClean="0">
+                <a:latin typeface="Calibri" panose="020F0502020204030204" pitchFamily="34" charset="0"/>
+              </a:rPr>
+              <a:t>Clans</a:t>
+            </a:r>
+            <a:endParaRPr lang="fr-FR" dirty="0" smtClean="0">
+              <a:latin typeface="Calibri" panose="020F0502020204030204" pitchFamily="34" charset="0"/>
+            </a:endParaRPr>
           </a:p>
           <a:p>
             <a:pPr lvl="1"/>
             <a:r>
-              <a:rPr lang="fr-FR" dirty="0" smtClean="0"/>
+              <a:rPr lang="fr-FR" dirty="0" smtClean="0">
+                <a:latin typeface="Calibri" panose="020F0502020204030204" pitchFamily="34" charset="0"/>
+              </a:rPr>
               <a:t>Springfield les </a:t>
             </a:r>
             <a:r>
-              <a:rPr lang="fr-FR" dirty="0" err="1" smtClean="0"/>
+              <a:rPr lang="fr-FR" dirty="0" err="1" smtClean="0">
+                <a:latin typeface="Calibri" panose="020F0502020204030204" pitchFamily="34" charset="0"/>
+              </a:rPr>
               <a:t>Simpsons</a:t>
             </a:r>
-            <a:endParaRPr lang="fr-FR" dirty="0" smtClean="0"/>
+            <a:endParaRPr lang="fr-FR" dirty="0" smtClean="0">
+              <a:latin typeface="Calibri" panose="020F0502020204030204" pitchFamily="34" charset="0"/>
+            </a:endParaRPr>
           </a:p>
           <a:p>
             <a:pPr lvl="1"/>
             <a:r>
-              <a:rPr lang="fr-FR" dirty="0" smtClean="0"/>
-              <a:t>Boom </a:t>
-            </a:r>
-            <a:r>
-              <a:rPr lang="fr-FR" dirty="0" err="1" smtClean="0"/>
-              <a:t>beach</a:t>
-            </a:r>
-            <a:endParaRPr lang="fr-FR" dirty="0" smtClean="0"/>
+              <a:rPr lang="fr-FR" dirty="0" smtClean="0">
+                <a:latin typeface="Calibri" panose="020F0502020204030204" pitchFamily="34" charset="0"/>
+              </a:rPr>
+              <a:t>Farmville</a:t>
+            </a:r>
+            <a:endParaRPr lang="fr-FR" dirty="0">
+              <a:latin typeface="Calibri" panose="020F0502020204030204" pitchFamily="34" charset="0"/>
+            </a:endParaRPr>
+          </a:p>
+          <a:p>
+            <a:r>
+              <a:rPr lang="fr-FR" dirty="0" smtClean="0">
+                <a:latin typeface="Calibri" panose="020F0502020204030204" pitchFamily="34" charset="0"/>
+              </a:rPr>
+              <a:t>Jeux de répétition</a:t>
+            </a:r>
           </a:p>
           <a:p>
             <a:pPr lvl="1"/>
             <a:r>
-              <a:rPr lang="fr-FR" dirty="0" smtClean="0"/>
-              <a:t>Farmville</a:t>
-            </a:r>
-            <a:endParaRPr lang="fr-FR" dirty="0"/>
-          </a:p>
-          <a:p>
-            <a:r>
-              <a:rPr lang="fr-FR" dirty="0" smtClean="0"/>
-              <a:t>Jeux de répétition</a:t>
-            </a:r>
+              <a:rPr lang="fr-FR" dirty="0" smtClean="0">
+                <a:latin typeface="Calibri" panose="020F0502020204030204" pitchFamily="34" charset="0"/>
+              </a:rPr>
+              <a:t>Candy </a:t>
+            </a:r>
+            <a:r>
+              <a:rPr lang="fr-FR" dirty="0" err="1">
+                <a:latin typeface="Calibri" panose="020F0502020204030204" pitchFamily="34" charset="0"/>
+              </a:rPr>
+              <a:t>C</a:t>
+            </a:r>
+            <a:r>
+              <a:rPr lang="fr-FR" dirty="0" err="1" smtClean="0">
+                <a:latin typeface="Calibri" panose="020F0502020204030204" pitchFamily="34" charset="0"/>
+              </a:rPr>
+              <a:t>rush</a:t>
+            </a:r>
+            <a:endParaRPr lang="fr-FR" dirty="0" smtClean="0">
+              <a:latin typeface="Calibri" panose="020F0502020204030204" pitchFamily="34" charset="0"/>
+            </a:endParaRPr>
           </a:p>
           <a:p>
             <a:pPr lvl="1"/>
             <a:r>
-              <a:rPr lang="fr-FR" dirty="0" smtClean="0"/>
-              <a:t>Candy </a:t>
-            </a:r>
-            <a:r>
-              <a:rPr lang="fr-FR" dirty="0" err="1" smtClean="0"/>
-              <a:t>crush</a:t>
-            </a:r>
-            <a:endParaRPr lang="fr-FR" dirty="0" smtClean="0"/>
-          </a:p>
-          <a:p>
-            <a:pPr lvl="1"/>
-            <a:r>
-              <a:rPr lang="fr-FR" dirty="0" smtClean="0"/>
+              <a:rPr lang="fr-FR" dirty="0" smtClean="0">
+                <a:latin typeface="Calibri" panose="020F0502020204030204" pitchFamily="34" charset="0"/>
+              </a:rPr>
               <a:t>Temple </a:t>
             </a:r>
             <a:r>
-              <a:rPr lang="fr-FR" dirty="0" err="1" smtClean="0"/>
-              <a:t>run</a:t>
-            </a:r>
-            <a:endParaRPr lang="fr-FR" dirty="0" smtClean="0"/>
+              <a:rPr lang="fr-FR" dirty="0" err="1">
+                <a:latin typeface="Calibri" panose="020F0502020204030204" pitchFamily="34" charset="0"/>
+              </a:rPr>
+              <a:t>R</a:t>
+            </a:r>
+            <a:r>
+              <a:rPr lang="fr-FR" dirty="0" err="1" smtClean="0">
+                <a:latin typeface="Calibri" panose="020F0502020204030204" pitchFamily="34" charset="0"/>
+              </a:rPr>
+              <a:t>un</a:t>
+            </a:r>
+            <a:endParaRPr lang="fr-FR" dirty="0" smtClean="0">
+              <a:latin typeface="Calibri" panose="020F0502020204030204" pitchFamily="34" charset="0"/>
+            </a:endParaRPr>
           </a:p>
           <a:p>
             <a:pPr lvl="1"/>
@@ -5729,10 +5778,1363 @@
           </a:p>
         </p:txBody>
       </p:sp>
+      <p:pic>
+        <p:nvPicPr>
+          <p:cNvPr id="4" name="Image 3"/>
+          <p:cNvPicPr>
+            <a:picLocks noChangeAspect="1"/>
+          </p:cNvPicPr>
+          <p:nvPr/>
+        </p:nvPicPr>
+        <p:blipFill>
+          <a:blip r:embed="rId2">
+            <a:extLst>
+              <a:ext uri="{28A0092B-C50C-407E-A947-70E740481C1C}">
+                <a14:useLocalDpi xmlns:a14="http://schemas.microsoft.com/office/drawing/2010/main" val="0"/>
+              </a:ext>
+            </a:extLst>
+          </a:blip>
+          <a:stretch>
+            <a:fillRect/>
+          </a:stretch>
+        </p:blipFill>
+        <p:spPr>
+          <a:xfrm>
+            <a:off x="4706738" y="1795732"/>
+            <a:ext cx="4422583" cy="2491596"/>
+          </a:xfrm>
+          <a:prstGeom prst="ellipse">
+            <a:avLst/>
+          </a:prstGeom>
+          <a:ln>
+            <a:noFill/>
+          </a:ln>
+          <a:effectLst>
+            <a:softEdge rad="112500"/>
+          </a:effectLst>
+        </p:spPr>
+      </p:pic>
+      <p:pic>
+        <p:nvPicPr>
+          <p:cNvPr id="5" name="Image 4"/>
+          <p:cNvPicPr>
+            <a:picLocks noChangeAspect="1"/>
+          </p:cNvPicPr>
+          <p:nvPr/>
+        </p:nvPicPr>
+        <p:blipFill>
+          <a:blip r:embed="rId3">
+            <a:extLst>
+              <a:ext uri="{28A0092B-C50C-407E-A947-70E740481C1C}">
+                <a14:useLocalDpi xmlns:a14="http://schemas.microsoft.com/office/drawing/2010/main" val="0"/>
+              </a:ext>
+            </a:extLst>
+          </a:blip>
+          <a:stretch>
+            <a:fillRect/>
+          </a:stretch>
+        </p:blipFill>
+        <p:spPr>
+          <a:xfrm>
+            <a:off x="8404105" y="1631191"/>
+            <a:ext cx="2259043" cy="3614468"/>
+          </a:xfrm>
+          <a:prstGeom prst="ellipse">
+            <a:avLst/>
+          </a:prstGeom>
+          <a:ln>
+            <a:noFill/>
+          </a:ln>
+          <a:effectLst>
+            <a:softEdge rad="112500"/>
+          </a:effectLst>
+        </p:spPr>
+      </p:pic>
+      <p:pic>
+        <p:nvPicPr>
+          <p:cNvPr id="6" name="Image 5"/>
+          <p:cNvPicPr>
+            <a:picLocks noChangeAspect="1"/>
+          </p:cNvPicPr>
+          <p:nvPr/>
+        </p:nvPicPr>
+        <p:blipFill>
+          <a:blip r:embed="rId4">
+            <a:extLst>
+              <a:ext uri="{28A0092B-C50C-407E-A947-70E740481C1C}">
+                <a14:useLocalDpi xmlns:a14="http://schemas.microsoft.com/office/drawing/2010/main" val="0"/>
+              </a:ext>
+            </a:extLst>
+          </a:blip>
+          <a:stretch>
+            <a:fillRect/>
+          </a:stretch>
+        </p:blipFill>
+        <p:spPr>
+          <a:xfrm>
+            <a:off x="5701973" y="3630528"/>
+            <a:ext cx="3603010" cy="2702258"/>
+          </a:xfrm>
+          <a:prstGeom prst="ellipse">
+            <a:avLst/>
+          </a:prstGeom>
+          <a:ln>
+            <a:noFill/>
+          </a:ln>
+          <a:effectLst>
+            <a:softEdge rad="112500"/>
+          </a:effectLst>
+        </p:spPr>
+      </p:pic>
     </p:spTree>
     <p:extLst>
       <p:ext uri="{BB962C8B-B14F-4D97-AF65-F5344CB8AC3E}">
         <p14:creationId xmlns:p14="http://schemas.microsoft.com/office/powerpoint/2010/main" val="777266753"/>
+      </p:ext>
+    </p:extLst>
+  </p:cSld>
+  <p:clrMapOvr>
+    <a:masterClrMapping/>
+  </p:clrMapOvr>
+</p:sld>
+</file>
+
+<file path=ppt/slides/slide3.xml><?xml version="1.0" encoding="utf-8"?>
+<p:sld xmlns:a="http://schemas.openxmlformats.org/drawingml/2006/main" xmlns:r="http://schemas.openxmlformats.org/officeDocument/2006/relationships" xmlns:p="http://schemas.openxmlformats.org/presentationml/2006/main">
+  <p:cSld>
+    <p:spTree>
+      <p:nvGrpSpPr>
+        <p:cNvPr id="1" name=""/>
+        <p:cNvGrpSpPr/>
+        <p:nvPr/>
+      </p:nvGrpSpPr>
+      <p:grpSpPr>
+        <a:xfrm>
+          <a:off x="0" y="0"/>
+          <a:ext cx="0" cy="0"/>
+          <a:chOff x="0" y="0"/>
+          <a:chExt cx="0" cy="0"/>
+        </a:xfrm>
+      </p:grpSpPr>
+      <p:sp>
+        <p:nvSpPr>
+          <p:cNvPr id="4" name="Titre 1"/>
+          <p:cNvSpPr txBox="1">
+            <a:spLocks/>
+          </p:cNvSpPr>
+          <p:nvPr/>
+        </p:nvSpPr>
+        <p:spPr>
+          <a:xfrm>
+            <a:off x="615200" y="424291"/>
+            <a:ext cx="8534400" cy="1507067"/>
+          </a:xfrm>
+          <a:prstGeom prst="rect">
+            <a:avLst/>
+          </a:prstGeom>
+          <a:effectLst/>
+        </p:spPr>
+        <p:txBody>
+          <a:bodyPr vert="horz" lIns="91440" tIns="45720" rIns="91440" bIns="45720" rtlCol="0" anchor="ctr">
+            <a:normAutofit/>
+          </a:bodyPr>
+          <a:lstStyle>
+            <a:lvl1pPr algn="l" defTabSz="457200" rtl="0" eaLnBrk="1" latinLnBrk="0" hangingPunct="1">
+              <a:spcBef>
+                <a:spcPct val="0"/>
+              </a:spcBef>
+              <a:buNone/>
+              <a:defRPr sz="3600" kern="1200" cap="all">
+                <a:ln w="3175" cmpd="sng">
+                  <a:noFill/>
+                </a:ln>
+                <a:solidFill>
+                  <a:schemeClr val="tx1"/>
+                </a:solidFill>
+                <a:effectLst/>
+                <a:latin typeface="+mj-lt"/>
+                <a:ea typeface="+mj-ea"/>
+                <a:cs typeface="+mj-cs"/>
+              </a:defRPr>
+            </a:lvl1pPr>
+            <a:lvl2pPr eaLnBrk="1" hangingPunct="1">
+              <a:defRPr>
+                <a:solidFill>
+                  <a:schemeClr val="tx2"/>
+                </a:solidFill>
+              </a:defRPr>
+            </a:lvl2pPr>
+            <a:lvl3pPr eaLnBrk="1" hangingPunct="1">
+              <a:defRPr>
+                <a:solidFill>
+                  <a:schemeClr val="tx2"/>
+                </a:solidFill>
+              </a:defRPr>
+            </a:lvl3pPr>
+            <a:lvl4pPr eaLnBrk="1" hangingPunct="1">
+              <a:defRPr>
+                <a:solidFill>
+                  <a:schemeClr val="tx2"/>
+                </a:solidFill>
+              </a:defRPr>
+            </a:lvl4pPr>
+            <a:lvl5pPr eaLnBrk="1" hangingPunct="1">
+              <a:defRPr>
+                <a:solidFill>
+                  <a:schemeClr val="tx2"/>
+                </a:solidFill>
+              </a:defRPr>
+            </a:lvl5pPr>
+            <a:lvl6pPr eaLnBrk="1" hangingPunct="1">
+              <a:defRPr>
+                <a:solidFill>
+                  <a:schemeClr val="tx2"/>
+                </a:solidFill>
+              </a:defRPr>
+            </a:lvl6pPr>
+            <a:lvl7pPr eaLnBrk="1" hangingPunct="1">
+              <a:defRPr>
+                <a:solidFill>
+                  <a:schemeClr val="tx2"/>
+                </a:solidFill>
+              </a:defRPr>
+            </a:lvl7pPr>
+            <a:lvl8pPr eaLnBrk="1" hangingPunct="1">
+              <a:defRPr>
+                <a:solidFill>
+                  <a:schemeClr val="tx2"/>
+                </a:solidFill>
+              </a:defRPr>
+            </a:lvl8pPr>
+            <a:lvl9pPr eaLnBrk="1" hangingPunct="1">
+              <a:defRPr>
+                <a:solidFill>
+                  <a:schemeClr val="tx2"/>
+                </a:solidFill>
+              </a:defRPr>
+            </a:lvl9pPr>
+          </a:lstStyle>
+          <a:p>
+            <a:r>
+              <a:rPr lang="fr-FR" dirty="0" smtClean="0">
+                <a:latin typeface="Calibri" panose="020F0502020204030204" pitchFamily="34" charset="0"/>
+              </a:rPr>
+              <a:t>Méthode de paiement</a:t>
+            </a:r>
+            <a:endParaRPr lang="fr-FR" dirty="0">
+              <a:latin typeface="Calibri" panose="020F0502020204030204" pitchFamily="34" charset="0"/>
+            </a:endParaRPr>
+          </a:p>
+        </p:txBody>
+      </p:sp>
+      <p:sp>
+        <p:nvSpPr>
+          <p:cNvPr id="5" name="Espace réservé du contenu 2"/>
+          <p:cNvSpPr txBox="1">
+            <a:spLocks/>
+          </p:cNvSpPr>
+          <p:nvPr/>
+        </p:nvSpPr>
+        <p:spPr>
+          <a:xfrm>
+            <a:off x="615200" y="1810591"/>
+            <a:ext cx="8534400" cy="3615267"/>
+          </a:xfrm>
+          <a:prstGeom prst="rect">
+            <a:avLst/>
+          </a:prstGeom>
+        </p:spPr>
+        <p:txBody>
+          <a:bodyPr vert="horz" lIns="91440" tIns="45720" rIns="91440" bIns="45720" rtlCol="0" anchor="ctr">
+            <a:normAutofit/>
+          </a:bodyPr>
+          <a:lstStyle>
+            <a:lvl1pPr marL="285750" indent="-285750" algn="l" defTabSz="457200" rtl="0" eaLnBrk="1" latinLnBrk="0" hangingPunct="1">
+              <a:spcBef>
+                <a:spcPct val="20000"/>
+              </a:spcBef>
+              <a:spcAft>
+                <a:spcPts val="600"/>
+              </a:spcAft>
+              <a:buClr>
+                <a:schemeClr val="tx1"/>
+              </a:buClr>
+              <a:buSzPct val="80000"/>
+              <a:buFont typeface="Wingdings 3" panose="05040102010807070707" pitchFamily="18" charset="2"/>
+              <a:buChar char=""/>
+              <a:defRPr sz="2000" kern="1200" cap="none">
+                <a:solidFill>
+                  <a:schemeClr val="bg2">
+                    <a:lumMod val="50000"/>
+                  </a:schemeClr>
+                </a:solidFill>
+                <a:effectLst/>
+                <a:latin typeface="+mn-lt"/>
+                <a:ea typeface="+mn-ea"/>
+                <a:cs typeface="+mn-cs"/>
+              </a:defRPr>
+            </a:lvl1pPr>
+            <a:lvl2pPr marL="742950" indent="-285750" algn="l" defTabSz="457200" rtl="0" eaLnBrk="1" latinLnBrk="0" hangingPunct="1">
+              <a:spcBef>
+                <a:spcPct val="20000"/>
+              </a:spcBef>
+              <a:spcAft>
+                <a:spcPts val="600"/>
+              </a:spcAft>
+              <a:buClr>
+                <a:schemeClr val="tx1"/>
+              </a:buClr>
+              <a:buSzPct val="80000"/>
+              <a:buFont typeface="Wingdings 3" panose="05040102010807070707" pitchFamily="18" charset="2"/>
+              <a:buChar char=""/>
+              <a:defRPr sz="1800" kern="1200" cap="none">
+                <a:solidFill>
+                  <a:schemeClr val="bg2">
+                    <a:lumMod val="50000"/>
+                  </a:schemeClr>
+                </a:solidFill>
+                <a:effectLst/>
+                <a:latin typeface="+mn-lt"/>
+                <a:ea typeface="+mn-ea"/>
+                <a:cs typeface="+mn-cs"/>
+              </a:defRPr>
+            </a:lvl2pPr>
+            <a:lvl3pPr marL="1200150" indent="-285750" algn="l" defTabSz="457200" rtl="0" eaLnBrk="1" latinLnBrk="0" hangingPunct="1">
+              <a:spcBef>
+                <a:spcPct val="20000"/>
+              </a:spcBef>
+              <a:spcAft>
+                <a:spcPts val="600"/>
+              </a:spcAft>
+              <a:buClr>
+                <a:schemeClr val="tx1"/>
+              </a:buClr>
+              <a:buSzPct val="80000"/>
+              <a:buFont typeface="Wingdings 3" panose="05040102010807070707" pitchFamily="18" charset="2"/>
+              <a:buChar char=""/>
+              <a:defRPr sz="1600" kern="1200" cap="none">
+                <a:solidFill>
+                  <a:schemeClr val="bg2">
+                    <a:lumMod val="50000"/>
+                  </a:schemeClr>
+                </a:solidFill>
+                <a:effectLst/>
+                <a:latin typeface="+mn-lt"/>
+                <a:ea typeface="+mn-ea"/>
+                <a:cs typeface="+mn-cs"/>
+              </a:defRPr>
+            </a:lvl3pPr>
+            <a:lvl4pPr marL="1543050" indent="-171450" algn="l" defTabSz="457200" rtl="0" eaLnBrk="1" latinLnBrk="0" hangingPunct="1">
+              <a:spcBef>
+                <a:spcPct val="20000"/>
+              </a:spcBef>
+              <a:spcAft>
+                <a:spcPts val="600"/>
+              </a:spcAft>
+              <a:buClr>
+                <a:schemeClr val="tx1"/>
+              </a:buClr>
+              <a:buSzPct val="80000"/>
+              <a:buFont typeface="Wingdings 3" panose="05040102010807070707" pitchFamily="18" charset="2"/>
+              <a:buChar char=""/>
+              <a:defRPr sz="1400" kern="1200" cap="none">
+                <a:solidFill>
+                  <a:schemeClr val="bg2">
+                    <a:lumMod val="50000"/>
+                  </a:schemeClr>
+                </a:solidFill>
+                <a:effectLst/>
+                <a:latin typeface="+mn-lt"/>
+                <a:ea typeface="+mn-ea"/>
+                <a:cs typeface="+mn-cs"/>
+              </a:defRPr>
+            </a:lvl4pPr>
+            <a:lvl5pPr marL="2114550" indent="-285750" algn="l" defTabSz="457200" rtl="0" eaLnBrk="1" latinLnBrk="0" hangingPunct="1">
+              <a:spcBef>
+                <a:spcPct val="20000"/>
+              </a:spcBef>
+              <a:spcAft>
+                <a:spcPts val="600"/>
+              </a:spcAft>
+              <a:buClr>
+                <a:schemeClr val="tx1"/>
+              </a:buClr>
+              <a:buSzPct val="80000"/>
+              <a:buFont typeface="Wingdings 3" panose="05040102010807070707" pitchFamily="18" charset="2"/>
+              <a:buChar char=""/>
+              <a:defRPr sz="1400" kern="1200" cap="none">
+                <a:solidFill>
+                  <a:schemeClr val="bg2">
+                    <a:lumMod val="50000"/>
+                  </a:schemeClr>
+                </a:solidFill>
+                <a:effectLst/>
+                <a:latin typeface="+mn-lt"/>
+                <a:ea typeface="+mn-ea"/>
+                <a:cs typeface="+mn-cs"/>
+              </a:defRPr>
+            </a:lvl5pPr>
+            <a:lvl6pPr marL="2514600" indent="-228600" algn="l" defTabSz="457200" rtl="0" eaLnBrk="1" latinLnBrk="0" hangingPunct="1">
+              <a:spcBef>
+                <a:spcPct val="20000"/>
+              </a:spcBef>
+              <a:spcAft>
+                <a:spcPts val="600"/>
+              </a:spcAft>
+              <a:buClr>
+                <a:schemeClr val="tx1"/>
+              </a:buClr>
+              <a:buSzPct val="80000"/>
+              <a:buFont typeface="Wingdings 3" panose="05040102010807070707" pitchFamily="18" charset="2"/>
+              <a:buChar char=""/>
+              <a:defRPr sz="1400" kern="1200" cap="none">
+                <a:solidFill>
+                  <a:schemeClr val="bg2">
+                    <a:lumMod val="50000"/>
+                  </a:schemeClr>
+                </a:solidFill>
+                <a:effectLst/>
+                <a:latin typeface="+mn-lt"/>
+                <a:ea typeface="+mn-ea"/>
+                <a:cs typeface="+mn-cs"/>
+              </a:defRPr>
+            </a:lvl6pPr>
+            <a:lvl7pPr marL="2971800" indent="-228600" algn="l" defTabSz="457200" rtl="0" eaLnBrk="1" latinLnBrk="0" hangingPunct="1">
+              <a:spcBef>
+                <a:spcPct val="20000"/>
+              </a:spcBef>
+              <a:spcAft>
+                <a:spcPts val="600"/>
+              </a:spcAft>
+              <a:buClr>
+                <a:schemeClr val="tx1"/>
+              </a:buClr>
+              <a:buSzPct val="80000"/>
+              <a:buFont typeface="Wingdings 3" panose="05040102010807070707" pitchFamily="18" charset="2"/>
+              <a:buChar char=""/>
+              <a:defRPr sz="1400" kern="1200" cap="none">
+                <a:solidFill>
+                  <a:schemeClr val="bg2">
+                    <a:lumMod val="50000"/>
+                  </a:schemeClr>
+                </a:solidFill>
+                <a:effectLst/>
+                <a:latin typeface="+mn-lt"/>
+                <a:ea typeface="+mn-ea"/>
+                <a:cs typeface="+mn-cs"/>
+              </a:defRPr>
+            </a:lvl7pPr>
+            <a:lvl8pPr marL="3429000" indent="-228600" algn="l" defTabSz="457200" rtl="0" eaLnBrk="1" latinLnBrk="0" hangingPunct="1">
+              <a:spcBef>
+                <a:spcPct val="20000"/>
+              </a:spcBef>
+              <a:spcAft>
+                <a:spcPts val="600"/>
+              </a:spcAft>
+              <a:buClr>
+                <a:schemeClr val="tx1"/>
+              </a:buClr>
+              <a:buSzPct val="80000"/>
+              <a:buFont typeface="Wingdings 3" panose="05040102010807070707" pitchFamily="18" charset="2"/>
+              <a:buChar char=""/>
+              <a:defRPr sz="1400" kern="1200" cap="none">
+                <a:solidFill>
+                  <a:schemeClr val="bg2">
+                    <a:lumMod val="50000"/>
+                  </a:schemeClr>
+                </a:solidFill>
+                <a:effectLst/>
+                <a:latin typeface="+mn-lt"/>
+                <a:ea typeface="+mn-ea"/>
+                <a:cs typeface="+mn-cs"/>
+              </a:defRPr>
+            </a:lvl8pPr>
+            <a:lvl9pPr marL="3886200" indent="-228600" algn="l" defTabSz="457200" rtl="0" eaLnBrk="1" latinLnBrk="0" hangingPunct="1">
+              <a:spcBef>
+                <a:spcPct val="20000"/>
+              </a:spcBef>
+              <a:spcAft>
+                <a:spcPts val="600"/>
+              </a:spcAft>
+              <a:buClr>
+                <a:schemeClr val="tx1"/>
+              </a:buClr>
+              <a:buSzPct val="80000"/>
+              <a:buFont typeface="Wingdings 3" panose="05040102010807070707" pitchFamily="18" charset="2"/>
+              <a:buChar char=""/>
+              <a:defRPr sz="1400" kern="1200" cap="none">
+                <a:solidFill>
+                  <a:schemeClr val="bg2">
+                    <a:lumMod val="50000"/>
+                  </a:schemeClr>
+                </a:solidFill>
+                <a:effectLst/>
+                <a:latin typeface="+mn-lt"/>
+                <a:ea typeface="+mn-ea"/>
+                <a:cs typeface="+mn-cs"/>
+              </a:defRPr>
+            </a:lvl9pPr>
+          </a:lstStyle>
+          <a:p>
+            <a:r>
+              <a:rPr lang="fr-FR" dirty="0" smtClean="0">
+                <a:latin typeface="Calibri" panose="020F0502020204030204" pitchFamily="34" charset="0"/>
+              </a:rPr>
+              <a:t>Monnaies virtuelles</a:t>
+            </a:r>
+          </a:p>
+          <a:p>
+            <a:pPr marL="457200" lvl="1" indent="0">
+              <a:buNone/>
+            </a:pPr>
+            <a:endParaRPr lang="fr-FR" dirty="0" smtClean="0">
+              <a:latin typeface="Calibri" panose="020F0502020204030204" pitchFamily="34" charset="0"/>
+            </a:endParaRPr>
+          </a:p>
+          <a:p>
+            <a:r>
+              <a:rPr lang="fr-FR" dirty="0" smtClean="0">
+                <a:latin typeface="Calibri" panose="020F0502020204030204" pitchFamily="34" charset="0"/>
+              </a:rPr>
+              <a:t>Micro Paiement</a:t>
+            </a:r>
+          </a:p>
+          <a:p>
+            <a:pPr marL="457200" lvl="1" indent="0">
+              <a:buNone/>
+            </a:pPr>
+            <a:endParaRPr lang="fr-FR" dirty="0" smtClean="0"/>
+          </a:p>
+          <a:p>
+            <a:pPr marL="457200" lvl="1" indent="0">
+              <a:buNone/>
+            </a:pPr>
+            <a:endParaRPr lang="fr-FR" dirty="0" smtClean="0"/>
+          </a:p>
+          <a:p>
+            <a:pPr marL="457200" lvl="1" indent="0">
+              <a:buNone/>
+            </a:pPr>
+            <a:endParaRPr lang="fr-FR" dirty="0"/>
+          </a:p>
+          <a:p>
+            <a:pPr marL="457200" lvl="1" indent="0">
+              <a:buNone/>
+            </a:pPr>
+            <a:endParaRPr lang="fr-FR" dirty="0" smtClean="0"/>
+          </a:p>
+          <a:p>
+            <a:pPr marL="457200" lvl="1" indent="0">
+              <a:buNone/>
+            </a:pPr>
+            <a:endParaRPr lang="fr-FR" dirty="0" smtClean="0"/>
+          </a:p>
+          <a:p>
+            <a:pPr lvl="1"/>
+            <a:endParaRPr lang="fr-FR" dirty="0" smtClean="0"/>
+          </a:p>
+        </p:txBody>
+      </p:sp>
+      <p:pic>
+        <p:nvPicPr>
+          <p:cNvPr id="9" name="Image 8"/>
+          <p:cNvPicPr>
+            <a:picLocks noChangeAspect="1"/>
+          </p:cNvPicPr>
+          <p:nvPr/>
+        </p:nvPicPr>
+        <p:blipFill>
+          <a:blip r:embed="rId2">
+            <a:extLst>
+              <a:ext uri="{28A0092B-C50C-407E-A947-70E740481C1C}">
+                <a14:useLocalDpi xmlns:a14="http://schemas.microsoft.com/office/drawing/2010/main" val="0"/>
+              </a:ext>
+            </a:extLst>
+          </a:blip>
+          <a:stretch>
+            <a:fillRect/>
+          </a:stretch>
+        </p:blipFill>
+        <p:spPr>
+          <a:xfrm>
+            <a:off x="6175863" y="773544"/>
+            <a:ext cx="3440346" cy="3123661"/>
+          </a:xfrm>
+          <a:prstGeom prst="rect">
+            <a:avLst/>
+          </a:prstGeom>
+        </p:spPr>
+      </p:pic>
+      <p:pic>
+        <p:nvPicPr>
+          <p:cNvPr id="10" name="Image 9"/>
+          <p:cNvPicPr>
+            <a:picLocks noChangeAspect="1"/>
+          </p:cNvPicPr>
+          <p:nvPr/>
+        </p:nvPicPr>
+        <p:blipFill>
+          <a:blip r:embed="rId3">
+            <a:extLst>
+              <a:ext uri="{28A0092B-C50C-407E-A947-70E740481C1C}">
+                <a14:useLocalDpi xmlns:a14="http://schemas.microsoft.com/office/drawing/2010/main" val="0"/>
+              </a:ext>
+            </a:extLst>
+          </a:blip>
+          <a:stretch>
+            <a:fillRect/>
+          </a:stretch>
+        </p:blipFill>
+        <p:spPr>
+          <a:xfrm>
+            <a:off x="5326448" y="3299706"/>
+            <a:ext cx="2569588" cy="2527540"/>
+          </a:xfrm>
+          <a:prstGeom prst="rect">
+            <a:avLst/>
+          </a:prstGeom>
+        </p:spPr>
+      </p:pic>
+      <p:pic>
+        <p:nvPicPr>
+          <p:cNvPr id="11" name="Image 10"/>
+          <p:cNvPicPr>
+            <a:picLocks noChangeAspect="1"/>
+          </p:cNvPicPr>
+          <p:nvPr/>
+        </p:nvPicPr>
+        <p:blipFill>
+          <a:blip r:embed="rId4">
+            <a:extLst>
+              <a:ext uri="{28A0092B-C50C-407E-A947-70E740481C1C}">
+                <a14:useLocalDpi xmlns:a14="http://schemas.microsoft.com/office/drawing/2010/main" val="0"/>
+              </a:ext>
+            </a:extLst>
+          </a:blip>
+          <a:stretch>
+            <a:fillRect/>
+          </a:stretch>
+        </p:blipFill>
+        <p:spPr>
+          <a:xfrm>
+            <a:off x="7581686" y="3233351"/>
+            <a:ext cx="2700131" cy="2192507"/>
+          </a:xfrm>
+          <a:prstGeom prst="rect">
+            <a:avLst/>
+          </a:prstGeom>
+        </p:spPr>
+      </p:pic>
+    </p:spTree>
+    <p:extLst>
+      <p:ext uri="{BB962C8B-B14F-4D97-AF65-F5344CB8AC3E}">
+        <p14:creationId xmlns:p14="http://schemas.microsoft.com/office/powerpoint/2010/main" val="1005853681"/>
+      </p:ext>
+    </p:extLst>
+  </p:cSld>
+  <p:clrMapOvr>
+    <a:masterClrMapping/>
+  </p:clrMapOvr>
+</p:sld>
+</file>
+
+<file path=ppt/slides/slide4.xml><?xml version="1.0" encoding="utf-8"?>
+<p:sld xmlns:a="http://schemas.openxmlformats.org/drawingml/2006/main" xmlns:r="http://schemas.openxmlformats.org/officeDocument/2006/relationships" xmlns:p="http://schemas.openxmlformats.org/presentationml/2006/main">
+  <p:cSld>
+    <p:spTree>
+      <p:nvGrpSpPr>
+        <p:cNvPr id="1" name=""/>
+        <p:cNvGrpSpPr/>
+        <p:nvPr/>
+      </p:nvGrpSpPr>
+      <p:grpSpPr>
+        <a:xfrm>
+          <a:off x="0" y="0"/>
+          <a:ext cx="0" cy="0"/>
+          <a:chOff x="0" y="0"/>
+          <a:chExt cx="0" cy="0"/>
+        </a:xfrm>
+      </p:grpSpPr>
+      <p:sp>
+        <p:nvSpPr>
+          <p:cNvPr id="4" name="Titre 1"/>
+          <p:cNvSpPr txBox="1">
+            <a:spLocks/>
+          </p:cNvSpPr>
+          <p:nvPr/>
+        </p:nvSpPr>
+        <p:spPr>
+          <a:xfrm>
+            <a:off x="615200" y="424291"/>
+            <a:ext cx="8534400" cy="1507067"/>
+          </a:xfrm>
+          <a:prstGeom prst="rect">
+            <a:avLst/>
+          </a:prstGeom>
+          <a:effectLst/>
+        </p:spPr>
+        <p:txBody>
+          <a:bodyPr vert="horz" lIns="91440" tIns="45720" rIns="91440" bIns="45720" rtlCol="0" anchor="ctr">
+            <a:normAutofit/>
+          </a:bodyPr>
+          <a:lstStyle>
+            <a:lvl1pPr algn="l" defTabSz="457200" rtl="0" eaLnBrk="1" latinLnBrk="0" hangingPunct="1">
+              <a:spcBef>
+                <a:spcPct val="0"/>
+              </a:spcBef>
+              <a:buNone/>
+              <a:defRPr sz="3600" kern="1200" cap="all">
+                <a:ln w="3175" cmpd="sng">
+                  <a:noFill/>
+                </a:ln>
+                <a:solidFill>
+                  <a:schemeClr val="tx1"/>
+                </a:solidFill>
+                <a:effectLst/>
+                <a:latin typeface="+mj-lt"/>
+                <a:ea typeface="+mj-ea"/>
+                <a:cs typeface="+mj-cs"/>
+              </a:defRPr>
+            </a:lvl1pPr>
+            <a:lvl2pPr eaLnBrk="1" hangingPunct="1">
+              <a:defRPr>
+                <a:solidFill>
+                  <a:schemeClr val="tx2"/>
+                </a:solidFill>
+              </a:defRPr>
+            </a:lvl2pPr>
+            <a:lvl3pPr eaLnBrk="1" hangingPunct="1">
+              <a:defRPr>
+                <a:solidFill>
+                  <a:schemeClr val="tx2"/>
+                </a:solidFill>
+              </a:defRPr>
+            </a:lvl3pPr>
+            <a:lvl4pPr eaLnBrk="1" hangingPunct="1">
+              <a:defRPr>
+                <a:solidFill>
+                  <a:schemeClr val="tx2"/>
+                </a:solidFill>
+              </a:defRPr>
+            </a:lvl4pPr>
+            <a:lvl5pPr eaLnBrk="1" hangingPunct="1">
+              <a:defRPr>
+                <a:solidFill>
+                  <a:schemeClr val="tx2"/>
+                </a:solidFill>
+              </a:defRPr>
+            </a:lvl5pPr>
+            <a:lvl6pPr eaLnBrk="1" hangingPunct="1">
+              <a:defRPr>
+                <a:solidFill>
+                  <a:schemeClr val="tx2"/>
+                </a:solidFill>
+              </a:defRPr>
+            </a:lvl6pPr>
+            <a:lvl7pPr eaLnBrk="1" hangingPunct="1">
+              <a:defRPr>
+                <a:solidFill>
+                  <a:schemeClr val="tx2"/>
+                </a:solidFill>
+              </a:defRPr>
+            </a:lvl7pPr>
+            <a:lvl8pPr eaLnBrk="1" hangingPunct="1">
+              <a:defRPr>
+                <a:solidFill>
+                  <a:schemeClr val="tx2"/>
+                </a:solidFill>
+              </a:defRPr>
+            </a:lvl8pPr>
+            <a:lvl9pPr eaLnBrk="1" hangingPunct="1">
+              <a:defRPr>
+                <a:solidFill>
+                  <a:schemeClr val="tx2"/>
+                </a:solidFill>
+              </a:defRPr>
+            </a:lvl9pPr>
+          </a:lstStyle>
+          <a:p>
+            <a:r>
+              <a:rPr lang="fr-FR" dirty="0" smtClean="0">
+                <a:latin typeface="Calibri" panose="020F0502020204030204" pitchFamily="34" charset="0"/>
+              </a:rPr>
+              <a:t>L’alternative </a:t>
+            </a:r>
+            <a:r>
+              <a:rPr lang="fr-FR" dirty="0" err="1" smtClean="0">
+                <a:latin typeface="Calibri" panose="020F0502020204030204" pitchFamily="34" charset="0"/>
+              </a:rPr>
+              <a:t>roger</a:t>
+            </a:r>
+            <a:endParaRPr lang="fr-FR" dirty="0">
+              <a:latin typeface="Calibri" panose="020F0502020204030204" pitchFamily="34" charset="0"/>
+            </a:endParaRPr>
+          </a:p>
+        </p:txBody>
+      </p:sp>
+      <p:sp>
+        <p:nvSpPr>
+          <p:cNvPr id="5" name="Espace réservé du contenu 2"/>
+          <p:cNvSpPr txBox="1">
+            <a:spLocks/>
+          </p:cNvSpPr>
+          <p:nvPr/>
+        </p:nvSpPr>
+        <p:spPr>
+          <a:xfrm>
+            <a:off x="615200" y="1810591"/>
+            <a:ext cx="8534400" cy="3615267"/>
+          </a:xfrm>
+          <a:prstGeom prst="rect">
+            <a:avLst/>
+          </a:prstGeom>
+        </p:spPr>
+        <p:txBody>
+          <a:bodyPr vert="horz" lIns="91440" tIns="45720" rIns="91440" bIns="45720" rtlCol="0" anchor="ctr">
+            <a:normAutofit/>
+          </a:bodyPr>
+          <a:lstStyle>
+            <a:lvl1pPr marL="285750" indent="-285750" algn="l" defTabSz="457200" rtl="0" eaLnBrk="1" latinLnBrk="0" hangingPunct="1">
+              <a:spcBef>
+                <a:spcPct val="20000"/>
+              </a:spcBef>
+              <a:spcAft>
+                <a:spcPts val="600"/>
+              </a:spcAft>
+              <a:buClr>
+                <a:schemeClr val="tx1"/>
+              </a:buClr>
+              <a:buSzPct val="80000"/>
+              <a:buFont typeface="Wingdings 3" panose="05040102010807070707" pitchFamily="18" charset="2"/>
+              <a:buChar char=""/>
+              <a:defRPr sz="2000" kern="1200" cap="none">
+                <a:solidFill>
+                  <a:schemeClr val="bg2">
+                    <a:lumMod val="50000"/>
+                  </a:schemeClr>
+                </a:solidFill>
+                <a:effectLst/>
+                <a:latin typeface="+mn-lt"/>
+                <a:ea typeface="+mn-ea"/>
+                <a:cs typeface="+mn-cs"/>
+              </a:defRPr>
+            </a:lvl1pPr>
+            <a:lvl2pPr marL="742950" indent="-285750" algn="l" defTabSz="457200" rtl="0" eaLnBrk="1" latinLnBrk="0" hangingPunct="1">
+              <a:spcBef>
+                <a:spcPct val="20000"/>
+              </a:spcBef>
+              <a:spcAft>
+                <a:spcPts val="600"/>
+              </a:spcAft>
+              <a:buClr>
+                <a:schemeClr val="tx1"/>
+              </a:buClr>
+              <a:buSzPct val="80000"/>
+              <a:buFont typeface="Wingdings 3" panose="05040102010807070707" pitchFamily="18" charset="2"/>
+              <a:buChar char=""/>
+              <a:defRPr sz="1800" kern="1200" cap="none">
+                <a:solidFill>
+                  <a:schemeClr val="bg2">
+                    <a:lumMod val="50000"/>
+                  </a:schemeClr>
+                </a:solidFill>
+                <a:effectLst/>
+                <a:latin typeface="+mn-lt"/>
+                <a:ea typeface="+mn-ea"/>
+                <a:cs typeface="+mn-cs"/>
+              </a:defRPr>
+            </a:lvl2pPr>
+            <a:lvl3pPr marL="1200150" indent="-285750" algn="l" defTabSz="457200" rtl="0" eaLnBrk="1" latinLnBrk="0" hangingPunct="1">
+              <a:spcBef>
+                <a:spcPct val="20000"/>
+              </a:spcBef>
+              <a:spcAft>
+                <a:spcPts val="600"/>
+              </a:spcAft>
+              <a:buClr>
+                <a:schemeClr val="tx1"/>
+              </a:buClr>
+              <a:buSzPct val="80000"/>
+              <a:buFont typeface="Wingdings 3" panose="05040102010807070707" pitchFamily="18" charset="2"/>
+              <a:buChar char=""/>
+              <a:defRPr sz="1600" kern="1200" cap="none">
+                <a:solidFill>
+                  <a:schemeClr val="bg2">
+                    <a:lumMod val="50000"/>
+                  </a:schemeClr>
+                </a:solidFill>
+                <a:effectLst/>
+                <a:latin typeface="+mn-lt"/>
+                <a:ea typeface="+mn-ea"/>
+                <a:cs typeface="+mn-cs"/>
+              </a:defRPr>
+            </a:lvl3pPr>
+            <a:lvl4pPr marL="1543050" indent="-171450" algn="l" defTabSz="457200" rtl="0" eaLnBrk="1" latinLnBrk="0" hangingPunct="1">
+              <a:spcBef>
+                <a:spcPct val="20000"/>
+              </a:spcBef>
+              <a:spcAft>
+                <a:spcPts val="600"/>
+              </a:spcAft>
+              <a:buClr>
+                <a:schemeClr val="tx1"/>
+              </a:buClr>
+              <a:buSzPct val="80000"/>
+              <a:buFont typeface="Wingdings 3" panose="05040102010807070707" pitchFamily="18" charset="2"/>
+              <a:buChar char=""/>
+              <a:defRPr sz="1400" kern="1200" cap="none">
+                <a:solidFill>
+                  <a:schemeClr val="bg2">
+                    <a:lumMod val="50000"/>
+                  </a:schemeClr>
+                </a:solidFill>
+                <a:effectLst/>
+                <a:latin typeface="+mn-lt"/>
+                <a:ea typeface="+mn-ea"/>
+                <a:cs typeface="+mn-cs"/>
+              </a:defRPr>
+            </a:lvl4pPr>
+            <a:lvl5pPr marL="2114550" indent="-285750" algn="l" defTabSz="457200" rtl="0" eaLnBrk="1" latinLnBrk="0" hangingPunct="1">
+              <a:spcBef>
+                <a:spcPct val="20000"/>
+              </a:spcBef>
+              <a:spcAft>
+                <a:spcPts val="600"/>
+              </a:spcAft>
+              <a:buClr>
+                <a:schemeClr val="tx1"/>
+              </a:buClr>
+              <a:buSzPct val="80000"/>
+              <a:buFont typeface="Wingdings 3" panose="05040102010807070707" pitchFamily="18" charset="2"/>
+              <a:buChar char=""/>
+              <a:defRPr sz="1400" kern="1200" cap="none">
+                <a:solidFill>
+                  <a:schemeClr val="bg2">
+                    <a:lumMod val="50000"/>
+                  </a:schemeClr>
+                </a:solidFill>
+                <a:effectLst/>
+                <a:latin typeface="+mn-lt"/>
+                <a:ea typeface="+mn-ea"/>
+                <a:cs typeface="+mn-cs"/>
+              </a:defRPr>
+            </a:lvl5pPr>
+            <a:lvl6pPr marL="2514600" indent="-228600" algn="l" defTabSz="457200" rtl="0" eaLnBrk="1" latinLnBrk="0" hangingPunct="1">
+              <a:spcBef>
+                <a:spcPct val="20000"/>
+              </a:spcBef>
+              <a:spcAft>
+                <a:spcPts val="600"/>
+              </a:spcAft>
+              <a:buClr>
+                <a:schemeClr val="tx1"/>
+              </a:buClr>
+              <a:buSzPct val="80000"/>
+              <a:buFont typeface="Wingdings 3" panose="05040102010807070707" pitchFamily="18" charset="2"/>
+              <a:buChar char=""/>
+              <a:defRPr sz="1400" kern="1200" cap="none">
+                <a:solidFill>
+                  <a:schemeClr val="bg2">
+                    <a:lumMod val="50000"/>
+                  </a:schemeClr>
+                </a:solidFill>
+                <a:effectLst/>
+                <a:latin typeface="+mn-lt"/>
+                <a:ea typeface="+mn-ea"/>
+                <a:cs typeface="+mn-cs"/>
+              </a:defRPr>
+            </a:lvl6pPr>
+            <a:lvl7pPr marL="2971800" indent="-228600" algn="l" defTabSz="457200" rtl="0" eaLnBrk="1" latinLnBrk="0" hangingPunct="1">
+              <a:spcBef>
+                <a:spcPct val="20000"/>
+              </a:spcBef>
+              <a:spcAft>
+                <a:spcPts val="600"/>
+              </a:spcAft>
+              <a:buClr>
+                <a:schemeClr val="tx1"/>
+              </a:buClr>
+              <a:buSzPct val="80000"/>
+              <a:buFont typeface="Wingdings 3" panose="05040102010807070707" pitchFamily="18" charset="2"/>
+              <a:buChar char=""/>
+              <a:defRPr sz="1400" kern="1200" cap="none">
+                <a:solidFill>
+                  <a:schemeClr val="bg2">
+                    <a:lumMod val="50000"/>
+                  </a:schemeClr>
+                </a:solidFill>
+                <a:effectLst/>
+                <a:latin typeface="+mn-lt"/>
+                <a:ea typeface="+mn-ea"/>
+                <a:cs typeface="+mn-cs"/>
+              </a:defRPr>
+            </a:lvl7pPr>
+            <a:lvl8pPr marL="3429000" indent="-228600" algn="l" defTabSz="457200" rtl="0" eaLnBrk="1" latinLnBrk="0" hangingPunct="1">
+              <a:spcBef>
+                <a:spcPct val="20000"/>
+              </a:spcBef>
+              <a:spcAft>
+                <a:spcPts val="600"/>
+              </a:spcAft>
+              <a:buClr>
+                <a:schemeClr val="tx1"/>
+              </a:buClr>
+              <a:buSzPct val="80000"/>
+              <a:buFont typeface="Wingdings 3" panose="05040102010807070707" pitchFamily="18" charset="2"/>
+              <a:buChar char=""/>
+              <a:defRPr sz="1400" kern="1200" cap="none">
+                <a:solidFill>
+                  <a:schemeClr val="bg2">
+                    <a:lumMod val="50000"/>
+                  </a:schemeClr>
+                </a:solidFill>
+                <a:effectLst/>
+                <a:latin typeface="+mn-lt"/>
+                <a:ea typeface="+mn-ea"/>
+                <a:cs typeface="+mn-cs"/>
+              </a:defRPr>
+            </a:lvl8pPr>
+            <a:lvl9pPr marL="3886200" indent="-228600" algn="l" defTabSz="457200" rtl="0" eaLnBrk="1" latinLnBrk="0" hangingPunct="1">
+              <a:spcBef>
+                <a:spcPct val="20000"/>
+              </a:spcBef>
+              <a:spcAft>
+                <a:spcPts val="600"/>
+              </a:spcAft>
+              <a:buClr>
+                <a:schemeClr val="tx1"/>
+              </a:buClr>
+              <a:buSzPct val="80000"/>
+              <a:buFont typeface="Wingdings 3" panose="05040102010807070707" pitchFamily="18" charset="2"/>
+              <a:buChar char=""/>
+              <a:defRPr sz="1400" kern="1200" cap="none">
+                <a:solidFill>
+                  <a:schemeClr val="bg2">
+                    <a:lumMod val="50000"/>
+                  </a:schemeClr>
+                </a:solidFill>
+                <a:effectLst/>
+                <a:latin typeface="+mn-lt"/>
+                <a:ea typeface="+mn-ea"/>
+                <a:cs typeface="+mn-cs"/>
+              </a:defRPr>
+            </a:lvl9pPr>
+          </a:lstStyle>
+          <a:p>
+            <a:r>
+              <a:rPr lang="fr-FR" dirty="0" smtClean="0">
+                <a:latin typeface="Calibri" panose="020F0502020204030204" pitchFamily="34" charset="0"/>
+              </a:rPr>
+              <a:t>Un jeu à multiples facettes</a:t>
+            </a:r>
+          </a:p>
+          <a:p>
+            <a:pPr marL="457200" lvl="1" indent="0">
+              <a:buNone/>
+            </a:pPr>
+            <a:endParaRPr lang="fr-FR" dirty="0" smtClean="0">
+              <a:latin typeface="Calibri" panose="020F0502020204030204" pitchFamily="34" charset="0"/>
+            </a:endParaRPr>
+          </a:p>
+          <a:p>
+            <a:r>
+              <a:rPr lang="fr-FR" dirty="0" smtClean="0">
+                <a:latin typeface="Calibri" panose="020F0502020204030204" pitchFamily="34" charset="0"/>
+              </a:rPr>
+              <a:t>Epargner pour jouer</a:t>
+            </a:r>
+          </a:p>
+          <a:p>
+            <a:endParaRPr lang="fr-FR" dirty="0">
+              <a:latin typeface="Calibri" panose="020F0502020204030204" pitchFamily="34" charset="0"/>
+            </a:endParaRPr>
+          </a:p>
+          <a:p>
+            <a:r>
+              <a:rPr lang="fr-FR" dirty="0" smtClean="0">
+                <a:latin typeface="Calibri" panose="020F0502020204030204" pitchFamily="34" charset="0"/>
+              </a:rPr>
+              <a:t>Jouer encore</a:t>
+            </a:r>
+          </a:p>
+          <a:p>
+            <a:endParaRPr lang="fr-FR" dirty="0">
+              <a:latin typeface="Calibri" panose="020F0502020204030204" pitchFamily="34" charset="0"/>
+            </a:endParaRPr>
+          </a:p>
+          <a:p>
+            <a:r>
+              <a:rPr lang="fr-FR" dirty="0" smtClean="0">
+                <a:latin typeface="Calibri" panose="020F0502020204030204" pitchFamily="34" charset="0"/>
+              </a:rPr>
+              <a:t>Possibilité de publicité</a:t>
+            </a:r>
+          </a:p>
+          <a:p>
+            <a:pPr lvl="1"/>
+            <a:endParaRPr lang="fr-FR" dirty="0" smtClean="0"/>
+          </a:p>
+        </p:txBody>
+      </p:sp>
+      <p:pic>
+        <p:nvPicPr>
+          <p:cNvPr id="11" name="Image 10"/>
+          <p:cNvPicPr>
+            <a:picLocks noChangeAspect="1"/>
+          </p:cNvPicPr>
+          <p:nvPr/>
+        </p:nvPicPr>
+        <p:blipFill>
+          <a:blip r:embed="rId2">
+            <a:extLst>
+              <a:ext uri="{28A0092B-C50C-407E-A947-70E740481C1C}">
+                <a14:useLocalDpi xmlns:a14="http://schemas.microsoft.com/office/drawing/2010/main" val="0"/>
+              </a:ext>
+            </a:extLst>
+          </a:blip>
+          <a:stretch>
+            <a:fillRect/>
+          </a:stretch>
+        </p:blipFill>
+        <p:spPr>
+          <a:xfrm>
+            <a:off x="5286207" y="1322263"/>
+            <a:ext cx="6045723" cy="2500999"/>
+          </a:xfrm>
+          <a:prstGeom prst="rect">
+            <a:avLst/>
+          </a:prstGeom>
+        </p:spPr>
+      </p:pic>
+      <p:pic>
+        <p:nvPicPr>
+          <p:cNvPr id="12" name="Image 11"/>
+          <p:cNvPicPr>
+            <a:picLocks noChangeAspect="1"/>
+          </p:cNvPicPr>
+          <p:nvPr/>
+        </p:nvPicPr>
+        <p:blipFill>
+          <a:blip r:embed="rId3">
+            <a:extLst>
+              <a:ext uri="{28A0092B-C50C-407E-A947-70E740481C1C}">
+                <a14:useLocalDpi xmlns:a14="http://schemas.microsoft.com/office/drawing/2010/main" val="0"/>
+              </a:ext>
+            </a:extLst>
+          </a:blip>
+          <a:stretch>
+            <a:fillRect/>
+          </a:stretch>
+        </p:blipFill>
+        <p:spPr>
+          <a:xfrm>
+            <a:off x="5750008" y="3823262"/>
+            <a:ext cx="2882007" cy="2113472"/>
+          </a:xfrm>
+          <a:prstGeom prst="rect">
+            <a:avLst/>
+          </a:prstGeom>
+        </p:spPr>
+      </p:pic>
+    </p:spTree>
+    <p:extLst>
+      <p:ext uri="{BB962C8B-B14F-4D97-AF65-F5344CB8AC3E}">
+        <p14:creationId xmlns:p14="http://schemas.microsoft.com/office/powerpoint/2010/main" val="2774401464"/>
+      </p:ext>
+    </p:extLst>
+  </p:cSld>
+  <p:clrMapOvr>
+    <a:masterClrMapping/>
+  </p:clrMapOvr>
+</p:sld>
+</file>
+
+<file path=ppt/slides/slide5.xml><?xml version="1.0" encoding="utf-8"?>
+<p:sld xmlns:a="http://schemas.openxmlformats.org/drawingml/2006/main" xmlns:r="http://schemas.openxmlformats.org/officeDocument/2006/relationships" xmlns:p="http://schemas.openxmlformats.org/presentationml/2006/main">
+  <p:cSld>
+    <p:spTree>
+      <p:nvGrpSpPr>
+        <p:cNvPr id="1" name=""/>
+        <p:cNvGrpSpPr/>
+        <p:nvPr/>
+      </p:nvGrpSpPr>
+      <p:grpSpPr>
+        <a:xfrm>
+          <a:off x="0" y="0"/>
+          <a:ext cx="0" cy="0"/>
+          <a:chOff x="0" y="0"/>
+          <a:chExt cx="0" cy="0"/>
+        </a:xfrm>
+      </p:grpSpPr>
+      <p:sp>
+        <p:nvSpPr>
+          <p:cNvPr id="4" name="Titre 1"/>
+          <p:cNvSpPr txBox="1">
+            <a:spLocks/>
+          </p:cNvSpPr>
+          <p:nvPr/>
+        </p:nvSpPr>
+        <p:spPr>
+          <a:xfrm>
+            <a:off x="615200" y="424291"/>
+            <a:ext cx="8534400" cy="1507067"/>
+          </a:xfrm>
+          <a:prstGeom prst="rect">
+            <a:avLst/>
+          </a:prstGeom>
+          <a:effectLst/>
+        </p:spPr>
+        <p:txBody>
+          <a:bodyPr vert="horz" lIns="91440" tIns="45720" rIns="91440" bIns="45720" rtlCol="0" anchor="ctr">
+            <a:normAutofit/>
+          </a:bodyPr>
+          <a:lstStyle>
+            <a:lvl1pPr algn="l" defTabSz="457200" rtl="0" eaLnBrk="1" latinLnBrk="0" hangingPunct="1">
+              <a:spcBef>
+                <a:spcPct val="0"/>
+              </a:spcBef>
+              <a:buNone/>
+              <a:defRPr sz="3600" kern="1200" cap="all">
+                <a:ln w="3175" cmpd="sng">
+                  <a:noFill/>
+                </a:ln>
+                <a:solidFill>
+                  <a:schemeClr val="tx1"/>
+                </a:solidFill>
+                <a:effectLst/>
+                <a:latin typeface="+mj-lt"/>
+                <a:ea typeface="+mj-ea"/>
+                <a:cs typeface="+mj-cs"/>
+              </a:defRPr>
+            </a:lvl1pPr>
+            <a:lvl2pPr eaLnBrk="1" hangingPunct="1">
+              <a:defRPr>
+                <a:solidFill>
+                  <a:schemeClr val="tx2"/>
+                </a:solidFill>
+              </a:defRPr>
+            </a:lvl2pPr>
+            <a:lvl3pPr eaLnBrk="1" hangingPunct="1">
+              <a:defRPr>
+                <a:solidFill>
+                  <a:schemeClr val="tx2"/>
+                </a:solidFill>
+              </a:defRPr>
+            </a:lvl3pPr>
+            <a:lvl4pPr eaLnBrk="1" hangingPunct="1">
+              <a:defRPr>
+                <a:solidFill>
+                  <a:schemeClr val="tx2"/>
+                </a:solidFill>
+              </a:defRPr>
+            </a:lvl4pPr>
+            <a:lvl5pPr eaLnBrk="1" hangingPunct="1">
+              <a:defRPr>
+                <a:solidFill>
+                  <a:schemeClr val="tx2"/>
+                </a:solidFill>
+              </a:defRPr>
+            </a:lvl5pPr>
+            <a:lvl6pPr eaLnBrk="1" hangingPunct="1">
+              <a:defRPr>
+                <a:solidFill>
+                  <a:schemeClr val="tx2"/>
+                </a:solidFill>
+              </a:defRPr>
+            </a:lvl6pPr>
+            <a:lvl7pPr eaLnBrk="1" hangingPunct="1">
+              <a:defRPr>
+                <a:solidFill>
+                  <a:schemeClr val="tx2"/>
+                </a:solidFill>
+              </a:defRPr>
+            </a:lvl7pPr>
+            <a:lvl8pPr eaLnBrk="1" hangingPunct="1">
+              <a:defRPr>
+                <a:solidFill>
+                  <a:schemeClr val="tx2"/>
+                </a:solidFill>
+              </a:defRPr>
+            </a:lvl8pPr>
+            <a:lvl9pPr eaLnBrk="1" hangingPunct="1">
+              <a:defRPr>
+                <a:solidFill>
+                  <a:schemeClr val="tx2"/>
+                </a:solidFill>
+              </a:defRPr>
+            </a:lvl9pPr>
+          </a:lstStyle>
+          <a:p>
+            <a:r>
+              <a:rPr lang="fr-FR" dirty="0" smtClean="0">
+                <a:latin typeface="Calibri" panose="020F0502020204030204" pitchFamily="34" charset="0"/>
+              </a:rPr>
+              <a:t>La </a:t>
+            </a:r>
+            <a:r>
+              <a:rPr lang="fr-FR" dirty="0" err="1" smtClean="0">
+                <a:latin typeface="Calibri" panose="020F0502020204030204" pitchFamily="34" charset="0"/>
+              </a:rPr>
+              <a:t>demonstration</a:t>
+            </a:r>
+            <a:endParaRPr lang="fr-FR" dirty="0">
+              <a:latin typeface="Calibri" panose="020F0502020204030204" pitchFamily="34" charset="0"/>
+            </a:endParaRPr>
+          </a:p>
+        </p:txBody>
+      </p:sp>
+      <p:pic>
+        <p:nvPicPr>
+          <p:cNvPr id="9" name="Image 8"/>
+          <p:cNvPicPr>
+            <a:picLocks noChangeAspect="1"/>
+          </p:cNvPicPr>
+          <p:nvPr/>
+        </p:nvPicPr>
+        <p:blipFill>
+          <a:blip r:embed="rId2"/>
+          <a:stretch>
+            <a:fillRect/>
+          </a:stretch>
+        </p:blipFill>
+        <p:spPr>
+          <a:xfrm>
+            <a:off x="2023342" y="1422399"/>
+            <a:ext cx="7289925" cy="4200684"/>
+          </a:xfrm>
+          <a:prstGeom prst="roundRect">
+            <a:avLst>
+              <a:gd name="adj" fmla="val 16667"/>
+            </a:avLst>
+          </a:prstGeom>
+          <a:ln>
+            <a:noFill/>
+          </a:ln>
+          <a:effectLst>
+            <a:outerShdw blurRad="152400" dist="12000" dir="900000" sy="98000" kx="110000" ky="200000" algn="tl" rotWithShape="0">
+              <a:srgbClr val="000000">
+                <a:alpha val="30000"/>
+              </a:srgbClr>
+            </a:outerShdw>
+          </a:effectLst>
+          <a:scene3d>
+            <a:camera prst="perspectiveRelaxed">
+              <a:rot lat="19800000" lon="1200000" rev="20820000"/>
+            </a:camera>
+            <a:lightRig rig="threePt" dir="t"/>
+          </a:scene3d>
+          <a:sp3d contourW="6350" prstMaterial="matte">
+            <a:bevelT w="101600" h="101600"/>
+            <a:contourClr>
+              <a:srgbClr val="969696"/>
+            </a:contourClr>
+          </a:sp3d>
+        </p:spPr>
+      </p:pic>
+    </p:spTree>
+    <p:extLst>
+      <p:ext uri="{BB962C8B-B14F-4D97-AF65-F5344CB8AC3E}">
+        <p14:creationId xmlns:p14="http://schemas.microsoft.com/office/powerpoint/2010/main" val="1085953957"/>
       </p:ext>
     </p:extLst>
   </p:cSld>

</xml_diff>